<commit_message>
trimming of files containing secrets
</commit_message>
<xml_diff>
--- a/Teaching/docs/FCC Chem 3A/FCC Chem 3A Chap  1 Content.pptx
+++ b/Teaching/docs/FCC Chem 3A/FCC Chem 3A Chap  1 Content.pptx
@@ -654,6 +654,7 @@
     </c:plotArea>
     <c:plotVisOnly val="1"/>
     <c:dispBlanksAs val="gap"/>
+    <c:showDLblsOverMax val="0"/>
     <c:extLst>
       <c:ext xmlns:c16r3="http://schemas.microsoft.com/office/drawing/2017/03/chart" uri="{56B9EC1D-385E-4148-901F-78D8002777C0}">
         <c16r3:dataDisplayOptions16>
@@ -661,7 +662,6 @@
         </c16r3:dataDisplayOptions16>
       </c:ext>
     </c:extLst>
-    <c:showDLblsOverMax val="0"/>
   </c:chart>
   <c:spPr>
     <a:solidFill>
@@ -1156,6 +1156,7 @@
     </c:plotArea>
     <c:plotVisOnly val="1"/>
     <c:dispBlanksAs val="gap"/>
+    <c:showDLblsOverMax val="0"/>
     <c:extLst>
       <c:ext xmlns:c16r3="http://schemas.microsoft.com/office/drawing/2017/03/chart" uri="{56B9EC1D-385E-4148-901F-78D8002777C0}">
         <c16r3:dataDisplayOptions16>
@@ -1163,7 +1164,6 @@
         </c16r3:dataDisplayOptions16>
       </c:ext>
     </c:extLst>
-    <c:showDLblsOverMax val="0"/>
   </c:chart>
   <c:spPr>
     <a:solidFill>
@@ -1667,6 +1667,7 @@
     </c:plotArea>
     <c:plotVisOnly val="1"/>
     <c:dispBlanksAs val="gap"/>
+    <c:showDLblsOverMax val="0"/>
     <c:extLst>
       <c:ext xmlns:c16r3="http://schemas.microsoft.com/office/drawing/2017/03/chart" uri="{56B9EC1D-385E-4148-901F-78D8002777C0}">
         <c16r3:dataDisplayOptions16>
@@ -1674,7 +1675,6 @@
         </c16r3:dataDisplayOptions16>
       </c:ext>
     </c:extLst>
-    <c:showDLblsOverMax val="0"/>
   </c:chart>
   <c:spPr>
     <a:solidFill>
@@ -2169,6 +2169,7 @@
     </c:plotArea>
     <c:plotVisOnly val="1"/>
     <c:dispBlanksAs val="gap"/>
+    <c:showDLblsOverMax val="0"/>
     <c:extLst>
       <c:ext xmlns:c16r3="http://schemas.microsoft.com/office/drawing/2017/03/chart" uri="{56B9EC1D-385E-4148-901F-78D8002777C0}">
         <c16r3:dataDisplayOptions16>
@@ -2176,7 +2177,6 @@
         </c16r3:dataDisplayOptions16>
       </c:ext>
     </c:extLst>
-    <c:showDLblsOverMax val="0"/>
   </c:chart>
   <c:spPr>
     <a:solidFill>
@@ -23224,7 +23224,6 @@
             </a:r>
           </a:p>
           <a:p>
-            <a:pPr lvl="1"/>
             <a:r>
               <a:rPr lang="en-US" dirty="0"/>
               <a:t>Canvas</a:t>
@@ -23234,7 +23233,27 @@
             <a:pPr lvl="1"/>
             <a:r>
               <a:rPr lang="en-US" dirty="0"/>
-              <a:t>Email: </a:t>
+              <a:t>Announcements</a:t>
+            </a:r>
+          </a:p>
+          <a:p>
+            <a:pPr lvl="1"/>
+            <a:r>
+              <a:rPr lang="en-US" dirty="0"/>
+              <a:t>Chat</a:t>
+            </a:r>
+          </a:p>
+          <a:p>
+            <a:r>
+              <a:rPr lang="en-US" dirty="0"/>
+              <a:t>Email</a:t>
+            </a:r>
+          </a:p>
+          <a:p>
+            <a:pPr lvl="1"/>
+            <a:r>
+              <a:rPr lang="en-US" dirty="0"/>
+              <a:t>Mitch.Halloran@fresnocitycollege.edu</a:t>
             </a:r>
           </a:p>
           <a:p>

</xml_diff>